<commit_message>
Added screenshot of investor community
</commit_message>
<xml_diff>
--- a/CMF.pptx
+++ b/CMF.pptx
@@ -124,7 +124,7 @@
   </p:defaultTextStyle>
   <p:extLst>
     <p:ext uri="{EFAFB233-063F-42B5-8137-9DF3F51BA10A}">
-      <p15:sldGuideLst xmlns:p15="http://schemas.microsoft.com/office/powerpoint/2012/main">
+      <p15:sldGuideLst xmlns:p15="http://schemas.microsoft.com/office/powerpoint/2012/main" xmlns="">
         <p15:guide id="1" orient="horz" pos="161">
           <p15:clr>
             <a:srgbClr val="A4A3A4"/>
@@ -168,7 +168,7 @@
       </p15:sldGuideLst>
     </p:ext>
     <p:ext uri="{2D200454-40CA-4A62-9FC3-DE9A4176ACB9}">
-      <p15:notesGuideLst xmlns:p15="http://schemas.microsoft.com/office/powerpoint/2012/main">
+      <p15:notesGuideLst xmlns:p15="http://schemas.microsoft.com/office/powerpoint/2012/main" xmlns="">
         <p15:guide id="1" orient="horz" pos="2924">
           <p15:clr>
             <a:srgbClr val="A4A3A4"/>
@@ -267,7 +267,7 @@
           <a:p>
             <a:fld id="{F0BB27B4-BE80-4A64-A720-975D9C2CD29D}" type="datetimeFigureOut">
               <a:rPr lang="en-US" smtClean="0"/>
-              <a:t>7/14/2017</a:t>
+              <a:t>07/18/2017</a:t>
             </a:fld>
             <a:endParaRPr lang="en-US"/>
           </a:p>
@@ -437,7 +437,7 @@
             <a:fld id="{80568A58-25BF-4ED8-BF3A-372FEB996820}" type="datetimeFigureOut">
               <a:rPr lang="en-US" smtClean="0"/>
               <a:pPr/>
-              <a:t>7/14/2017</a:t>
+              <a:t>07/18/2017</a:t>
             </a:fld>
             <a:endParaRPr lang="en-US" dirty="0"/>
           </a:p>
@@ -7218,7 +7218,7 @@
         </p:blipFill>
         <p:spPr bwMode="auto">
           <a:xfrm>
-            <a:off x="4770471" y="2615267"/>
+            <a:off x="4800600" y="2832981"/>
             <a:ext cx="4048273" cy="2332289"/>
           </a:xfrm>
           <a:prstGeom prst="rect">
@@ -7245,6 +7245,47 @@
                 <a:headEnd/>
                 <a:tailEnd/>
               </a14:hiddenLine>
+            </a:ext>
+          </a:extLst>
+        </p:spPr>
+      </p:pic>
+      <p:pic>
+        <p:nvPicPr>
+          <p:cNvPr id="1026" name="Picture 2" descr="C:\Users\a604266\AppData\Local\Microsoft\Windows\Temporary Internet Files\Content.Outlook\INFTGZX2\FIC - Home Page.png"/>
+          <p:cNvPicPr>
+            <a:picLocks noChangeAspect="1" noChangeArrowheads="1"/>
+          </p:cNvPicPr>
+          <p:nvPr/>
+        </p:nvPicPr>
+        <p:blipFill>
+          <a:blip r:embed="rId4" cstate="print">
+            <a:extLst>
+              <a:ext uri="{28A0092B-C50C-407E-A947-70E740481C1C}">
+                <a14:useLocalDpi xmlns:a14="http://schemas.microsoft.com/office/drawing/2010/main" val="0"/>
+              </a:ext>
+            </a:extLst>
+          </a:blip>
+          <a:srcRect/>
+          <a:stretch>
+            <a:fillRect/>
+          </a:stretch>
+        </p:blipFill>
+        <p:spPr bwMode="auto">
+          <a:xfrm>
+            <a:off x="5196175" y="211202"/>
+            <a:ext cx="3257121" cy="2404065"/>
+          </a:xfrm>
+          <a:prstGeom prst="rect">
+            <a:avLst/>
+          </a:prstGeom>
+          <a:noFill/>
+          <a:extLst>
+            <a:ext uri="{909E8E84-426E-40DD-AFC4-6F175D3DCCD1}">
+              <a14:hiddenFill xmlns:a14="http://schemas.microsoft.com/office/drawing/2010/main">
+                <a:solidFill>
+                  <a:srgbClr val="FFFFFF"/>
+                </a:solidFill>
+              </a14:hiddenFill>
             </a:ext>
           </a:extLst>
         </p:spPr>

</xml_diff>